<commit_message>
Update Android 2 - Nhom 9- Thuyet Trinh.pptx
</commit_message>
<xml_diff>
--- a/Nop/Android 2 - Nhom 9- Thuyet Trinh.pptx
+++ b/Nop/Android 2 - Nhom 9- Thuyet Trinh.pptx
@@ -19,7 +19,8 @@
     <p:sldId id="266" r:id="rId13"/>
     <p:sldId id="267" r:id="rId14"/>
     <p:sldId id="268" r:id="rId15"/>
-    <p:sldId id="269" r:id="rId16"/>
+    <p:sldId id="271" r:id="rId16"/>
+    <p:sldId id="269" r:id="rId17"/>
   </p:sldIdLst>
   <p:sldSz cx="12192000" cy="6858000"/>
   <p:notesSz cx="6858000" cy="9144000"/>
@@ -356,7 +357,7 @@
             <a:fld id="{B61BEF0D-F0BB-DE4B-95CE-6DB70DBA9567}" type="datetimeFigureOut">
               <a:rPr lang="en-US" dirty="0"/>
               <a:pPr/>
-              <a:t>5/8/2020</a:t>
+              <a:t>8/5/2020</a:t>
             </a:fld>
             <a:endParaRPr lang="en-US" dirty="0"/>
           </a:p>
@@ -687,7 +688,7 @@
             <a:fld id="{B61BEF0D-F0BB-DE4B-95CE-6DB70DBA9567}" type="datetimeFigureOut">
               <a:rPr lang="en-US" dirty="0"/>
               <a:pPr/>
-              <a:t>5/8/2020</a:t>
+              <a:t>8/5/2020</a:t>
             </a:fld>
             <a:endParaRPr lang="en-US" dirty="0"/>
           </a:p>
@@ -962,7 +963,7 @@
             <a:fld id="{B61BEF0D-F0BB-DE4B-95CE-6DB70DBA9567}" type="datetimeFigureOut">
               <a:rPr lang="en-US" dirty="0"/>
               <a:pPr/>
-              <a:t>5/8/2020</a:t>
+              <a:t>8/5/2020</a:t>
             </a:fld>
             <a:endParaRPr lang="en-US" dirty="0"/>
           </a:p>
@@ -1527,7 +1528,7 @@
             <a:fld id="{B61BEF0D-F0BB-DE4B-95CE-6DB70DBA9567}" type="datetimeFigureOut">
               <a:rPr lang="en-US" dirty="0"/>
               <a:pPr/>
-              <a:t>5/8/2020</a:t>
+              <a:t>8/5/2020</a:t>
             </a:fld>
             <a:endParaRPr lang="en-US" dirty="0"/>
           </a:p>
@@ -1802,7 +1803,7 @@
             <a:fld id="{B61BEF0D-F0BB-DE4B-95CE-6DB70DBA9567}" type="datetimeFigureOut">
               <a:rPr lang="en-US" dirty="0"/>
               <a:pPr/>
-              <a:t>5/8/2020</a:t>
+              <a:t>8/5/2020</a:t>
             </a:fld>
             <a:endParaRPr lang="en-US" dirty="0"/>
           </a:p>
@@ -2361,7 +2362,7 @@
             <a:fld id="{B61BEF0D-F0BB-DE4B-95CE-6DB70DBA9567}" type="datetimeFigureOut">
               <a:rPr lang="en-US" dirty="0"/>
               <a:pPr/>
-              <a:t>5/8/2020</a:t>
+              <a:t>8/5/2020</a:t>
             </a:fld>
             <a:endParaRPr lang="en-US" dirty="0"/>
           </a:p>
@@ -2685,7 +2686,7 @@
             <a:fld id="{B61BEF0D-F0BB-DE4B-95CE-6DB70DBA9567}" type="datetimeFigureOut">
               <a:rPr lang="en-US" dirty="0"/>
               <a:pPr/>
-              <a:t>5/8/2020</a:t>
+              <a:t>8/5/2020</a:t>
             </a:fld>
             <a:endParaRPr lang="en-US" dirty="0"/>
           </a:p>
@@ -2859,7 +2860,7 @@
             <a:fld id="{B61BEF0D-F0BB-DE4B-95CE-6DB70DBA9567}" type="datetimeFigureOut">
               <a:rPr lang="en-US" dirty="0"/>
               <a:pPr/>
-              <a:t>5/8/2020</a:t>
+              <a:t>8/5/2020</a:t>
             </a:fld>
             <a:endParaRPr lang="en-US" dirty="0"/>
           </a:p>
@@ -3094,7 +3095,7 @@
             <a:fld id="{B61BEF0D-F0BB-DE4B-95CE-6DB70DBA9567}" type="datetimeFigureOut">
               <a:rPr lang="en-US" dirty="0"/>
               <a:pPr/>
-              <a:t>5/8/2020</a:t>
+              <a:t>8/5/2020</a:t>
             </a:fld>
             <a:endParaRPr lang="en-US" dirty="0"/>
           </a:p>
@@ -3291,7 +3292,7 @@
             <a:fld id="{B61BEF0D-F0BB-DE4B-95CE-6DB70DBA9567}" type="datetimeFigureOut">
               <a:rPr lang="en-US" dirty="0"/>
               <a:pPr/>
-              <a:t>5/8/2020</a:t>
+              <a:t>8/5/2020</a:t>
             </a:fld>
             <a:endParaRPr lang="en-US" dirty="0"/>
           </a:p>
@@ -3564,7 +3565,7 @@
             <a:fld id="{B61BEF0D-F0BB-DE4B-95CE-6DB70DBA9567}" type="datetimeFigureOut">
               <a:rPr lang="en-US" dirty="0"/>
               <a:pPr/>
-              <a:t>5/8/2020</a:t>
+              <a:t>8/5/2020</a:t>
             </a:fld>
             <a:endParaRPr lang="en-US" dirty="0"/>
           </a:p>
@@ -3827,7 +3828,7 @@
             <a:fld id="{B61BEF0D-F0BB-DE4B-95CE-6DB70DBA9567}" type="datetimeFigureOut">
               <a:rPr lang="en-US" dirty="0"/>
               <a:pPr/>
-              <a:t>5/8/2020</a:t>
+              <a:t>8/5/2020</a:t>
             </a:fld>
             <a:endParaRPr lang="en-US" dirty="0"/>
           </a:p>
@@ -4198,7 +4199,7 @@
             <a:fld id="{B61BEF0D-F0BB-DE4B-95CE-6DB70DBA9567}" type="datetimeFigureOut">
               <a:rPr lang="en-US" dirty="0"/>
               <a:pPr/>
-              <a:t>5/8/2020</a:t>
+              <a:t>8/5/2020</a:t>
             </a:fld>
             <a:endParaRPr lang="en-US" dirty="0"/>
           </a:p>
@@ -4343,7 +4344,7 @@
             <a:fld id="{B61BEF0D-F0BB-DE4B-95CE-6DB70DBA9567}" type="datetimeFigureOut">
               <a:rPr lang="en-US" dirty="0"/>
               <a:pPr/>
-              <a:t>5/8/2020</a:t>
+              <a:t>8/5/2020</a:t>
             </a:fld>
             <a:endParaRPr lang="en-US" dirty="0"/>
           </a:p>
@@ -4465,7 +4466,7 @@
             <a:fld id="{B61BEF0D-F0BB-DE4B-95CE-6DB70DBA9567}" type="datetimeFigureOut">
               <a:rPr lang="en-US" dirty="0"/>
               <a:pPr/>
-              <a:t>5/8/2020</a:t>
+              <a:t>8/5/2020</a:t>
             </a:fld>
             <a:endParaRPr lang="en-US" dirty="0"/>
           </a:p>
@@ -4747,7 +4748,7 @@
             <a:fld id="{B61BEF0D-F0BB-DE4B-95CE-6DB70DBA9567}" type="datetimeFigureOut">
               <a:rPr lang="en-US" dirty="0"/>
               <a:pPr/>
-              <a:t>5/8/2020</a:t>
+              <a:t>8/5/2020</a:t>
             </a:fld>
             <a:endParaRPr lang="en-US" dirty="0"/>
           </a:p>
@@ -5068,7 +5069,7 @@
             <a:fld id="{B61BEF0D-F0BB-DE4B-95CE-6DB70DBA9567}" type="datetimeFigureOut">
               <a:rPr lang="en-US" dirty="0"/>
               <a:pPr/>
-              <a:t>5/8/2020</a:t>
+              <a:t>8/5/2020</a:t>
             </a:fld>
             <a:endParaRPr lang="en-US" dirty="0"/>
           </a:p>
@@ -5279,7 +5280,7 @@
             <a:fld id="{B61BEF0D-F0BB-DE4B-95CE-6DB70DBA9567}" type="datetimeFigureOut">
               <a:rPr lang="en-US" dirty="0"/>
               <a:pPr/>
-              <a:t>5/8/2020</a:t>
+              <a:t>8/5/2020</a:t>
             </a:fld>
             <a:endParaRPr lang="en-US" dirty="0"/>
           </a:p>
@@ -6725,57 +6726,338 @@
               <a:buChar char="-"/>
             </a:pPr>
             <a:r>
-              <a:rPr lang="en-US"/>
+              <a:rPr lang="en-US" dirty="0"/>
               <a:t>Ng</a:t>
             </a:r>
             <a:r>
-              <a:rPr lang="vi-VN"/>
+              <a:rPr lang="vi-VN" dirty="0"/>
               <a:t>ư</a:t>
             </a:r>
             <a:r>
-              <a:rPr lang="en-US"/>
-              <a:t>ời dùng có thể theo dõi thống kê tất cả đ</a:t>
-            </a:r>
-            <a:r>
-              <a:rPr lang="vi-VN"/>
+              <a:rPr lang="en-US" dirty="0" err="1"/>
+              <a:t>ời</a:t>
+            </a:r>
+            <a:r>
+              <a:rPr lang="en-US" dirty="0"/>
+              <a:t> </a:t>
+            </a:r>
+            <a:r>
+              <a:rPr lang="en-US" dirty="0" err="1"/>
+              <a:t>dùng</a:t>
+            </a:r>
+            <a:r>
+              <a:rPr lang="en-US" dirty="0"/>
+              <a:t> </a:t>
+            </a:r>
+            <a:r>
+              <a:rPr lang="en-US" dirty="0" err="1"/>
+              <a:t>có</a:t>
+            </a:r>
+            <a:r>
+              <a:rPr lang="en-US" dirty="0"/>
+              <a:t> </a:t>
+            </a:r>
+            <a:r>
+              <a:rPr lang="en-US" dirty="0" err="1"/>
+              <a:t>thể</a:t>
+            </a:r>
+            <a:r>
+              <a:rPr lang="en-US" dirty="0"/>
+              <a:t> </a:t>
+            </a:r>
+            <a:r>
+              <a:rPr lang="en-US" dirty="0" err="1"/>
+              <a:t>theo</a:t>
+            </a:r>
+            <a:r>
+              <a:rPr lang="en-US" dirty="0"/>
+              <a:t> </a:t>
+            </a:r>
+            <a:r>
+              <a:rPr lang="en-US" dirty="0" err="1"/>
+              <a:t>dõi</a:t>
+            </a:r>
+            <a:r>
+              <a:rPr lang="en-US" dirty="0"/>
+              <a:t> </a:t>
+            </a:r>
+            <a:r>
+              <a:rPr lang="en-US" dirty="0" err="1"/>
+              <a:t>thống</a:t>
+            </a:r>
+            <a:r>
+              <a:rPr lang="en-US" dirty="0"/>
+              <a:t> </a:t>
+            </a:r>
+            <a:r>
+              <a:rPr lang="en-US" dirty="0" err="1"/>
+              <a:t>kê</a:t>
+            </a:r>
+            <a:r>
+              <a:rPr lang="en-US" dirty="0"/>
+              <a:t> </a:t>
+            </a:r>
+            <a:r>
+              <a:rPr lang="en-US" dirty="0" err="1"/>
+              <a:t>tất</a:t>
+            </a:r>
+            <a:r>
+              <a:rPr lang="en-US" dirty="0"/>
+              <a:t> </a:t>
+            </a:r>
+            <a:r>
+              <a:rPr lang="en-US" dirty="0" err="1"/>
+              <a:t>cả</a:t>
+            </a:r>
+            <a:r>
+              <a:rPr lang="en-US" dirty="0"/>
+              <a:t> đ</a:t>
+            </a:r>
+            <a:r>
+              <a:rPr lang="vi-VN" dirty="0"/>
               <a:t>ơ</a:t>
             </a:r>
             <a:r>
-              <a:rPr lang="en-US"/>
-              <a:t>n hang của mình từ tr</a:t>
-            </a:r>
-            <a:r>
-              <a:rPr lang="vi-VN"/>
+              <a:rPr lang="en-US" dirty="0"/>
+              <a:t>n </a:t>
+            </a:r>
+            <a:r>
+              <a:rPr lang="en-US" dirty="0" err="1" smtClean="0"/>
+              <a:t>hàng</a:t>
+            </a:r>
+            <a:r>
+              <a:rPr lang="en-US" dirty="0" smtClean="0"/>
+              <a:t> </a:t>
+            </a:r>
+            <a:r>
+              <a:rPr lang="en-US" dirty="0" err="1"/>
+              <a:t>của</a:t>
+            </a:r>
+            <a:r>
+              <a:rPr lang="en-US" dirty="0"/>
+              <a:t> </a:t>
+            </a:r>
+            <a:r>
+              <a:rPr lang="en-US" dirty="0" err="1"/>
+              <a:t>mình</a:t>
+            </a:r>
+            <a:r>
+              <a:rPr lang="en-US" dirty="0"/>
+              <a:t> </a:t>
+            </a:r>
+            <a:r>
+              <a:rPr lang="en-US" dirty="0" err="1"/>
+              <a:t>từ</a:t>
+            </a:r>
+            <a:r>
+              <a:rPr lang="en-US" dirty="0"/>
+              <a:t> </a:t>
+            </a:r>
+            <a:r>
+              <a:rPr lang="en-US" dirty="0" err="1"/>
+              <a:t>tr</a:t>
+            </a:r>
+            <a:r>
+              <a:rPr lang="vi-VN" dirty="0"/>
               <a:t>ư</a:t>
             </a:r>
             <a:r>
-              <a:rPr lang="en-US"/>
-              <a:t>ớc giờ nh</a:t>
-            </a:r>
-            <a:r>
-              <a:rPr lang="vi-VN"/>
+              <a:rPr lang="en-US" dirty="0" err="1"/>
+              <a:t>ớc</a:t>
+            </a:r>
+            <a:r>
+              <a:rPr lang="en-US" dirty="0"/>
+              <a:t> </a:t>
+            </a:r>
+            <a:r>
+              <a:rPr lang="en-US" dirty="0" err="1"/>
+              <a:t>giờ</a:t>
+            </a:r>
+            <a:r>
+              <a:rPr lang="en-US" dirty="0"/>
+              <a:t> </a:t>
+            </a:r>
+            <a:r>
+              <a:rPr lang="en-US" dirty="0" err="1"/>
+              <a:t>nh</a:t>
+            </a:r>
+            <a:r>
+              <a:rPr lang="vi-VN" dirty="0"/>
               <a:t>ư</a:t>
             </a:r>
             <a:r>
-              <a:rPr lang="en-US"/>
-              <a:t> thế nào, dựa vào thống kê tình trạng đ</a:t>
-            </a:r>
-            <a:r>
-              <a:rPr lang="vi-VN"/>
+              <a:rPr lang="en-US" dirty="0"/>
+              <a:t> </a:t>
+            </a:r>
+            <a:r>
+              <a:rPr lang="en-US" dirty="0" err="1"/>
+              <a:t>thế</a:t>
+            </a:r>
+            <a:r>
+              <a:rPr lang="en-US" dirty="0"/>
+              <a:t> </a:t>
+            </a:r>
+            <a:r>
+              <a:rPr lang="en-US" dirty="0" err="1"/>
+              <a:t>nào</a:t>
+            </a:r>
+            <a:r>
+              <a:rPr lang="en-US" dirty="0"/>
+              <a:t>, </a:t>
+            </a:r>
+            <a:r>
+              <a:rPr lang="en-US" dirty="0" err="1"/>
+              <a:t>dựa</a:t>
+            </a:r>
+            <a:r>
+              <a:rPr lang="en-US" dirty="0"/>
+              <a:t> </a:t>
+            </a:r>
+            <a:r>
+              <a:rPr lang="en-US" dirty="0" err="1"/>
+              <a:t>vào</a:t>
+            </a:r>
+            <a:r>
+              <a:rPr lang="en-US" dirty="0"/>
+              <a:t> </a:t>
+            </a:r>
+            <a:r>
+              <a:rPr lang="en-US" dirty="0" err="1"/>
+              <a:t>thống</a:t>
+            </a:r>
+            <a:r>
+              <a:rPr lang="en-US" dirty="0"/>
+              <a:t> </a:t>
+            </a:r>
+            <a:r>
+              <a:rPr lang="en-US" dirty="0" err="1"/>
+              <a:t>kê</a:t>
+            </a:r>
+            <a:r>
+              <a:rPr lang="en-US" dirty="0"/>
+              <a:t> </a:t>
+            </a:r>
+            <a:r>
+              <a:rPr lang="en-US" dirty="0" err="1"/>
+              <a:t>tình</a:t>
+            </a:r>
+            <a:r>
+              <a:rPr lang="en-US" dirty="0"/>
+              <a:t> </a:t>
+            </a:r>
+            <a:r>
+              <a:rPr lang="en-US" dirty="0" err="1"/>
+              <a:t>trạng</a:t>
+            </a:r>
+            <a:r>
+              <a:rPr lang="en-US" dirty="0"/>
+              <a:t> đ</a:t>
+            </a:r>
+            <a:r>
+              <a:rPr lang="vi-VN" dirty="0"/>
               <a:t>ơ</a:t>
             </a:r>
             <a:r>
-              <a:rPr lang="en-US"/>
-              <a:t>n, qua đó có h</a:t>
-            </a:r>
-            <a:r>
-              <a:rPr lang="vi-VN"/>
+              <a:rPr lang="en-US" dirty="0"/>
+              <a:t>n, qua </a:t>
+            </a:r>
+            <a:r>
+              <a:rPr lang="en-US" dirty="0" err="1"/>
+              <a:t>đó</a:t>
+            </a:r>
+            <a:r>
+              <a:rPr lang="en-US" dirty="0"/>
+              <a:t> </a:t>
+            </a:r>
+            <a:r>
+              <a:rPr lang="en-US" dirty="0" err="1"/>
+              <a:t>có</a:t>
+            </a:r>
+            <a:r>
+              <a:rPr lang="en-US" dirty="0"/>
+              <a:t> h</a:t>
+            </a:r>
+            <a:r>
+              <a:rPr lang="vi-VN" dirty="0"/>
               <a:t>ư</a:t>
             </a:r>
             <a:r>
-              <a:rPr lang="en-US"/>
-              <a:t>ớng phát triển phù hợp với cửa hàng của mình</a:t>
-            </a:r>
+              <a:rPr lang="en-US" dirty="0" err="1"/>
+              <a:t>ớng</a:t>
+            </a:r>
+            <a:r>
+              <a:rPr lang="en-US" dirty="0"/>
+              <a:t> </a:t>
+            </a:r>
+            <a:r>
+              <a:rPr lang="en-US" dirty="0" err="1"/>
+              <a:t>phát</a:t>
+            </a:r>
+            <a:r>
+              <a:rPr lang="en-US" dirty="0"/>
+              <a:t> </a:t>
+            </a:r>
+            <a:r>
+              <a:rPr lang="en-US" dirty="0" err="1"/>
+              <a:t>triển</a:t>
+            </a:r>
+            <a:r>
+              <a:rPr lang="en-US" dirty="0"/>
+              <a:t> </a:t>
+            </a:r>
+            <a:r>
+              <a:rPr lang="en-US" dirty="0" err="1"/>
+              <a:t>phù</a:t>
+            </a:r>
+            <a:r>
+              <a:rPr lang="en-US" dirty="0"/>
+              <a:t> </a:t>
+            </a:r>
+            <a:r>
+              <a:rPr lang="en-US" dirty="0" err="1"/>
+              <a:t>hợp</a:t>
+            </a:r>
+            <a:r>
+              <a:rPr lang="en-US" dirty="0"/>
+              <a:t> </a:t>
+            </a:r>
+            <a:r>
+              <a:rPr lang="en-US" dirty="0" err="1"/>
+              <a:t>với</a:t>
+            </a:r>
+            <a:r>
+              <a:rPr lang="en-US" dirty="0"/>
+              <a:t> </a:t>
+            </a:r>
+            <a:r>
+              <a:rPr lang="en-US" dirty="0" err="1"/>
+              <a:t>cửa</a:t>
+            </a:r>
+            <a:r>
+              <a:rPr lang="en-US" dirty="0"/>
+              <a:t> </a:t>
+            </a:r>
+            <a:r>
+              <a:rPr lang="en-US" dirty="0" err="1"/>
+              <a:t>hàng</a:t>
+            </a:r>
+            <a:r>
+              <a:rPr lang="en-US" dirty="0"/>
+              <a:t> </a:t>
+            </a:r>
+            <a:r>
+              <a:rPr lang="en-US" dirty="0" err="1"/>
+              <a:t>của</a:t>
+            </a:r>
+            <a:r>
+              <a:rPr lang="en-US" dirty="0"/>
+              <a:t> </a:t>
+            </a:r>
+            <a:r>
+              <a:rPr lang="en-US" dirty="0" err="1"/>
+              <a:t>mình</a:t>
+            </a:r>
+            <a:endParaRPr lang="en-US" dirty="0"/>
           </a:p>
         </p:txBody>
       </p:sp>
@@ -6792,6 +7074,13 @@
   <p:transition spd="slow">
     <p:wipe/>
   </p:transition>
+  <p:timing>
+    <p:tnLst>
+      <p:par>
+        <p:cTn id="1" dur="indefinite" restart="never" nodeType="tmRoot"/>
+      </p:par>
+    </p:tnLst>
+  </p:timing>
 </p:sld>
 </file>
 
@@ -6967,10 +7256,485 @@
   <p:transition spd="slow">
     <p:wipe/>
   </p:transition>
+  <p:timing>
+    <p:tnLst>
+      <p:par>
+        <p:cTn id="1" dur="indefinite" restart="never" nodeType="tmRoot"/>
+      </p:par>
+    </p:tnLst>
+  </p:timing>
 </p:sld>
 </file>
 
 <file path=ppt/slides/slide15.xml><?xml version="1.0" encoding="utf-8"?>
+<p:sld xmlns:a="http://schemas.openxmlformats.org/drawingml/2006/main" xmlns:r="http://schemas.openxmlformats.org/officeDocument/2006/relationships" xmlns:p="http://schemas.openxmlformats.org/presentationml/2006/main">
+  <p:cSld>
+    <p:spTree>
+      <p:nvGrpSpPr>
+        <p:cNvPr id="1" name=""/>
+        <p:cNvGrpSpPr/>
+        <p:nvPr/>
+      </p:nvGrpSpPr>
+      <p:grpSpPr>
+        <a:xfrm>
+          <a:off x="0" y="0"/>
+          <a:ext cx="0" cy="0"/>
+          <a:chOff x="0" y="0"/>
+          <a:chExt cx="0" cy="0"/>
+        </a:xfrm>
+      </p:grpSpPr>
+      <p:sp>
+        <p:nvSpPr>
+          <p:cNvPr id="2" name="Title 1"/>
+          <p:cNvSpPr>
+            <a:spLocks noGrp="1"/>
+          </p:cNvSpPr>
+          <p:nvPr>
+            <p:ph type="title"/>
+          </p:nvPr>
+        </p:nvSpPr>
+        <p:spPr/>
+        <p:txBody>
+          <a:bodyPr/>
+          <a:lstStyle/>
+          <a:p>
+            <a:r>
+              <a:rPr lang="en-US" dirty="0" err="1" smtClean="0"/>
+              <a:t>Góp</a:t>
+            </a:r>
+            <a:r>
+              <a:rPr lang="en-US" dirty="0" smtClean="0"/>
+              <a:t> ý </a:t>
+            </a:r>
+            <a:r>
+              <a:rPr lang="en-US" dirty="0" err="1" smtClean="0"/>
+              <a:t>của</a:t>
+            </a:r>
+            <a:r>
+              <a:rPr lang="en-US" dirty="0" smtClean="0"/>
+              <a:t> </a:t>
+            </a:r>
+            <a:r>
+              <a:rPr lang="en-US" dirty="0" err="1" smtClean="0"/>
+              <a:t>giáo</a:t>
+            </a:r>
+            <a:r>
+              <a:rPr lang="en-US" dirty="0" smtClean="0"/>
+              <a:t> </a:t>
+            </a:r>
+            <a:r>
+              <a:rPr lang="en-US" dirty="0" err="1" smtClean="0"/>
+              <a:t>viên</a:t>
+            </a:r>
+            <a:r>
+              <a:rPr lang="en-US" dirty="0" smtClean="0"/>
+              <a:t> </a:t>
+            </a:r>
+            <a:r>
+              <a:rPr lang="en-US" dirty="0" err="1" smtClean="0"/>
+              <a:t>hướng</a:t>
+            </a:r>
+            <a:r>
+              <a:rPr lang="en-US" dirty="0" smtClean="0"/>
+              <a:t> </a:t>
+            </a:r>
+            <a:r>
+              <a:rPr lang="en-US" dirty="0" err="1" smtClean="0"/>
+              <a:t>dẫn</a:t>
+            </a:r>
+            <a:endParaRPr lang="en-US" dirty="0"/>
+          </a:p>
+        </p:txBody>
+      </p:sp>
+      <p:sp>
+        <p:nvSpPr>
+          <p:cNvPr id="3" name="Content Placeholder 2"/>
+          <p:cNvSpPr>
+            <a:spLocks noGrp="1"/>
+          </p:cNvSpPr>
+          <p:nvPr>
+            <p:ph idx="1"/>
+          </p:nvPr>
+        </p:nvSpPr>
+        <p:spPr>
+          <a:xfrm>
+            <a:off x="113211" y="1541417"/>
+            <a:ext cx="11747863" cy="4606835"/>
+          </a:xfrm>
+        </p:spPr>
+        <p:txBody>
+          <a:bodyPr>
+            <a:normAutofit/>
+          </a:bodyPr>
+          <a:lstStyle/>
+          <a:p>
+            <a:r>
+              <a:rPr lang="en-US" sz="3200" dirty="0" err="1" smtClean="0"/>
+              <a:t>Chấm</a:t>
+            </a:r>
+            <a:r>
+              <a:rPr lang="en-US" sz="3200" dirty="0" smtClean="0"/>
+              <a:t> </a:t>
+            </a:r>
+            <a:r>
+              <a:rPr lang="en-US" sz="3200" dirty="0" err="1" smtClean="0"/>
+              <a:t>lần</a:t>
+            </a:r>
+            <a:r>
+              <a:rPr lang="en-US" sz="3200" dirty="0" smtClean="0"/>
+              <a:t> 1 : 7đ</a:t>
+            </a:r>
+          </a:p>
+          <a:p>
+            <a:r>
+              <a:rPr lang="en-US" sz="3200" dirty="0" err="1" smtClean="0"/>
+              <a:t>Góp</a:t>
+            </a:r>
+            <a:r>
+              <a:rPr lang="en-US" sz="3200" dirty="0" smtClean="0"/>
+              <a:t> ý </a:t>
+            </a:r>
+            <a:r>
+              <a:rPr lang="en-US" sz="3200" dirty="0" err="1" smtClean="0"/>
+              <a:t>chấm</a:t>
+            </a:r>
+            <a:r>
+              <a:rPr lang="en-US" sz="3200" dirty="0" smtClean="0"/>
+              <a:t> </a:t>
+            </a:r>
+            <a:r>
+              <a:rPr lang="en-US" sz="3200" dirty="0" err="1" smtClean="0"/>
+              <a:t>lần</a:t>
+            </a:r>
+            <a:r>
+              <a:rPr lang="en-US" sz="3200" dirty="0" smtClean="0"/>
+              <a:t> 2 </a:t>
+            </a:r>
+            <a:r>
+              <a:rPr lang="en-US" sz="3200" dirty="0" err="1" smtClean="0"/>
+              <a:t>của</a:t>
+            </a:r>
+            <a:r>
+              <a:rPr lang="en-US" sz="3200" dirty="0" smtClean="0"/>
+              <a:t> </a:t>
+            </a:r>
+            <a:r>
+              <a:rPr lang="en-US" sz="3200" dirty="0" err="1" smtClean="0"/>
+              <a:t>giáo</a:t>
+            </a:r>
+            <a:r>
+              <a:rPr lang="en-US" sz="3200" dirty="0" smtClean="0"/>
+              <a:t> </a:t>
+            </a:r>
+            <a:r>
+              <a:rPr lang="en-US" sz="3200" dirty="0" err="1" smtClean="0"/>
+              <a:t>viên</a:t>
+            </a:r>
+            <a:r>
+              <a:rPr lang="en-US" sz="3200" dirty="0" smtClean="0"/>
+              <a:t>:</a:t>
+            </a:r>
+          </a:p>
+          <a:p>
+            <a:pPr lvl="1"/>
+            <a:r>
+              <a:rPr lang="en-US" sz="3200" dirty="0" err="1" smtClean="0"/>
+              <a:t>Trang</a:t>
+            </a:r>
+            <a:r>
+              <a:rPr lang="en-US" sz="3200" dirty="0" smtClean="0"/>
+              <a:t> </a:t>
+            </a:r>
+            <a:r>
+              <a:rPr lang="en-US" sz="3200" dirty="0" err="1" smtClean="0"/>
+              <a:t>đơn</a:t>
+            </a:r>
+            <a:r>
+              <a:rPr lang="en-US" sz="3200" dirty="0" smtClean="0"/>
+              <a:t> </a:t>
+            </a:r>
+            <a:r>
+              <a:rPr lang="en-US" sz="3200" dirty="0" err="1" smtClean="0"/>
+              <a:t>đặt</a:t>
+            </a:r>
+            <a:r>
+              <a:rPr lang="en-US" sz="3200" dirty="0" smtClean="0"/>
+              <a:t> </a:t>
+            </a:r>
+            <a:r>
+              <a:rPr lang="en-US" sz="3200" dirty="0" err="1" smtClean="0"/>
+              <a:t>hàng</a:t>
+            </a:r>
+            <a:r>
+              <a:rPr lang="en-US" sz="3200" dirty="0" smtClean="0"/>
+              <a:t> </a:t>
+            </a:r>
+            <a:r>
+              <a:rPr lang="en-US" sz="3200" dirty="0" err="1" smtClean="0"/>
+              <a:t>sử</a:t>
+            </a:r>
+            <a:r>
+              <a:rPr lang="en-US" sz="3200" dirty="0" smtClean="0"/>
+              <a:t> </a:t>
+            </a:r>
+            <a:r>
+              <a:rPr lang="en-US" sz="3200" dirty="0" err="1" smtClean="0"/>
+              <a:t>dụng</a:t>
+            </a:r>
+            <a:r>
+              <a:rPr lang="en-US" sz="3200" dirty="0" smtClean="0"/>
+              <a:t> Custom Spinner, </a:t>
+            </a:r>
+            <a:r>
+              <a:rPr lang="en-US" sz="3200" dirty="0" err="1" smtClean="0"/>
+              <a:t>có</a:t>
+            </a:r>
+            <a:r>
+              <a:rPr lang="en-US" sz="3200" dirty="0" smtClean="0"/>
+              <a:t> </a:t>
+            </a:r>
+            <a:r>
+              <a:rPr lang="en-US" sz="3200" dirty="0" err="1" smtClean="0"/>
+              <a:t>hình</a:t>
+            </a:r>
+            <a:r>
+              <a:rPr lang="en-US" sz="3200" dirty="0" smtClean="0"/>
+              <a:t> </a:t>
+            </a:r>
+            <a:r>
+              <a:rPr lang="en-US" sz="3200" dirty="0" err="1" smtClean="0"/>
+              <a:t>ảnh</a:t>
+            </a:r>
+            <a:r>
+              <a:rPr lang="en-US" sz="3200" dirty="0" smtClean="0"/>
+              <a:t> </a:t>
+            </a:r>
+            <a:r>
+              <a:rPr lang="en-US" sz="3200" dirty="0" err="1" smtClean="0"/>
+              <a:t>để</a:t>
+            </a:r>
+            <a:r>
+              <a:rPr lang="en-US" sz="3200" dirty="0" smtClean="0"/>
+              <a:t> </a:t>
+            </a:r>
+            <a:r>
+              <a:rPr lang="en-US" sz="3200" dirty="0" err="1" smtClean="0"/>
+              <a:t>biết</a:t>
+            </a:r>
+            <a:r>
+              <a:rPr lang="en-US" sz="3200" dirty="0" smtClean="0"/>
+              <a:t> </a:t>
+            </a:r>
+            <a:r>
+              <a:rPr lang="en-US" sz="3200" dirty="0" err="1" smtClean="0"/>
+              <a:t>rõ</a:t>
+            </a:r>
+            <a:r>
+              <a:rPr lang="en-US" sz="3200" dirty="0" smtClean="0"/>
+              <a:t> </a:t>
+            </a:r>
+            <a:r>
+              <a:rPr lang="en-US" sz="3200" dirty="0" err="1" smtClean="0"/>
+              <a:t>sản</a:t>
+            </a:r>
+            <a:r>
+              <a:rPr lang="en-US" sz="3200" dirty="0" smtClean="0"/>
+              <a:t> </a:t>
+            </a:r>
+            <a:r>
+              <a:rPr lang="en-US" sz="3200" dirty="0" err="1" smtClean="0"/>
+              <a:t>phẩm</a:t>
+            </a:r>
+            <a:r>
+              <a:rPr lang="en-US" sz="3200" dirty="0" smtClean="0"/>
+              <a:t> </a:t>
+            </a:r>
+            <a:r>
+              <a:rPr lang="en-US" sz="3200" dirty="0" err="1" smtClean="0"/>
+              <a:t>nào</a:t>
+            </a:r>
+            <a:r>
+              <a:rPr lang="en-US" sz="3200" dirty="0" smtClean="0"/>
+              <a:t>, </a:t>
+            </a:r>
+            <a:r>
+              <a:rPr lang="en-US" sz="3200" dirty="0" err="1" smtClean="0"/>
+              <a:t>sử</a:t>
+            </a:r>
+            <a:r>
+              <a:rPr lang="en-US" sz="3200" dirty="0" smtClean="0"/>
+              <a:t> </a:t>
+            </a:r>
+            <a:r>
+              <a:rPr lang="en-US" sz="3200" dirty="0" err="1" smtClean="0"/>
+              <a:t>dụng</a:t>
+            </a:r>
+            <a:r>
+              <a:rPr lang="en-US" sz="3200" dirty="0" smtClean="0"/>
+              <a:t> Text Input Layout.</a:t>
+            </a:r>
+          </a:p>
+          <a:p>
+            <a:pPr lvl="1"/>
+            <a:r>
+              <a:rPr lang="en-US" sz="3200" dirty="0" err="1" smtClean="0"/>
+              <a:t>Thêm</a:t>
+            </a:r>
+            <a:r>
+              <a:rPr lang="en-US" sz="3200" dirty="0" smtClean="0"/>
+              <a:t> </a:t>
+            </a:r>
+            <a:r>
+              <a:rPr lang="en-US" sz="3200" dirty="0" err="1" smtClean="0"/>
+              <a:t>cột</a:t>
+            </a:r>
+            <a:r>
+              <a:rPr lang="en-US" sz="3200" dirty="0" smtClean="0"/>
+              <a:t> </a:t>
+            </a:r>
+            <a:r>
+              <a:rPr lang="en-US" sz="3200" dirty="0" err="1" smtClean="0"/>
+              <a:t>tình</a:t>
+            </a:r>
+            <a:r>
+              <a:rPr lang="en-US" sz="3200" dirty="0" smtClean="0"/>
+              <a:t> </a:t>
+            </a:r>
+            <a:r>
+              <a:rPr lang="en-US" sz="3200" dirty="0" err="1" smtClean="0"/>
+              <a:t>trạng</a:t>
+            </a:r>
+            <a:r>
+              <a:rPr lang="en-US" sz="3200" dirty="0" smtClean="0"/>
+              <a:t> </a:t>
+            </a:r>
+            <a:r>
+              <a:rPr lang="en-US" sz="3200" dirty="0" err="1" smtClean="0"/>
+              <a:t>đơn</a:t>
+            </a:r>
+            <a:r>
+              <a:rPr lang="en-US" sz="3200" dirty="0" smtClean="0"/>
+              <a:t> </a:t>
+            </a:r>
+            <a:r>
+              <a:rPr lang="en-US" sz="3200" dirty="0" err="1" smtClean="0"/>
+              <a:t>hàng</a:t>
+            </a:r>
+            <a:r>
+              <a:rPr lang="en-US" sz="3200" dirty="0" smtClean="0"/>
+              <a:t> </a:t>
+            </a:r>
+            <a:r>
+              <a:rPr lang="en-US" sz="3200" dirty="0" err="1" smtClean="0"/>
+              <a:t>để</a:t>
+            </a:r>
+            <a:r>
+              <a:rPr lang="en-US" sz="3200" dirty="0" smtClean="0"/>
+              <a:t> </a:t>
+            </a:r>
+            <a:r>
+              <a:rPr lang="en-US" sz="3200" dirty="0" err="1" smtClean="0"/>
+              <a:t>dễ</a:t>
+            </a:r>
+            <a:r>
+              <a:rPr lang="en-US" sz="3200" dirty="0" smtClean="0"/>
+              <a:t> </a:t>
+            </a:r>
+            <a:r>
+              <a:rPr lang="en-US" sz="3200" dirty="0" err="1" smtClean="0"/>
+              <a:t>quản</a:t>
+            </a:r>
+            <a:r>
+              <a:rPr lang="en-US" sz="3200" dirty="0" smtClean="0"/>
+              <a:t> </a:t>
+            </a:r>
+            <a:r>
+              <a:rPr lang="en-US" sz="3200" dirty="0" err="1" smtClean="0"/>
+              <a:t>lý</a:t>
+            </a:r>
+            <a:r>
+              <a:rPr lang="en-US" sz="3200" dirty="0" smtClean="0"/>
+              <a:t> </a:t>
+            </a:r>
+            <a:r>
+              <a:rPr lang="en-US" sz="3200" dirty="0" err="1" smtClean="0"/>
+              <a:t>hơn</a:t>
+            </a:r>
+            <a:r>
+              <a:rPr lang="en-US" sz="3200" dirty="0" smtClean="0"/>
+              <a:t>.</a:t>
+            </a:r>
+          </a:p>
+          <a:p>
+            <a:pPr lvl="1"/>
+            <a:r>
+              <a:rPr lang="en-US" sz="3200" dirty="0" err="1" smtClean="0"/>
+              <a:t>Thống</a:t>
+            </a:r>
+            <a:r>
+              <a:rPr lang="en-US" sz="3200" dirty="0" smtClean="0"/>
+              <a:t> </a:t>
+            </a:r>
+            <a:r>
+              <a:rPr lang="en-US" sz="3200" dirty="0" err="1" smtClean="0"/>
+              <a:t>kê</a:t>
+            </a:r>
+            <a:r>
+              <a:rPr lang="en-US" sz="3200" dirty="0" smtClean="0"/>
+              <a:t> </a:t>
+            </a:r>
+            <a:r>
+              <a:rPr lang="en-US" sz="3200" dirty="0" err="1" smtClean="0"/>
+              <a:t>đơn</a:t>
+            </a:r>
+            <a:r>
+              <a:rPr lang="en-US" sz="3200" dirty="0" smtClean="0"/>
+              <a:t> </a:t>
+            </a:r>
+            <a:r>
+              <a:rPr lang="en-US" sz="3200" dirty="0" err="1" smtClean="0"/>
+              <a:t>đặt</a:t>
+            </a:r>
+            <a:r>
+              <a:rPr lang="en-US" sz="3200" dirty="0" smtClean="0"/>
+              <a:t> </a:t>
+            </a:r>
+            <a:r>
+              <a:rPr lang="en-US" sz="3200" dirty="0" err="1" smtClean="0"/>
+              <a:t>hàng</a:t>
+            </a:r>
+            <a:r>
+              <a:rPr lang="en-US" sz="3200" dirty="0" smtClean="0"/>
+              <a:t> (</a:t>
+            </a:r>
+            <a:r>
+              <a:rPr lang="en-US" sz="3200" dirty="0" err="1" smtClean="0"/>
+              <a:t>dùng</a:t>
+            </a:r>
+            <a:r>
+              <a:rPr lang="en-US" sz="3200" dirty="0" smtClean="0"/>
+              <a:t> chart).</a:t>
+            </a:r>
+          </a:p>
+        </p:txBody>
+      </p:sp>
+    </p:spTree>
+    <p:extLst>
+      <p:ext uri="{BB962C8B-B14F-4D97-AF65-F5344CB8AC3E}">
+        <p14:creationId xmlns:p14="http://schemas.microsoft.com/office/powerpoint/2010/main" val="219780586"/>
+      </p:ext>
+    </p:extLst>
+  </p:cSld>
+  <p:clrMapOvr>
+    <a:masterClrMapping/>
+  </p:clrMapOvr>
+  <p:transition spd="slow">
+    <p:wipe/>
+  </p:transition>
+</p:sld>
+</file>
+
+<file path=ppt/slides/slide16.xml><?xml version="1.0" encoding="utf-8"?>
 <p:sld xmlns:a="http://schemas.openxmlformats.org/drawingml/2006/main" xmlns:r="http://schemas.openxmlformats.org/officeDocument/2006/relationships" xmlns:p="http://schemas.openxmlformats.org/presentationml/2006/main">
   <p:cSld>
     <p:spTree>
@@ -7074,13 +7838,32 @@
         </p:nvSpPr>
         <p:spPr/>
         <p:txBody>
-          <a:bodyPr/>
-          <a:lstStyle/>
-          <a:p>
-            <a:r>
-              <a:rPr lang="en-US"/>
-              <a:t>Nhóm 9 – Thành viên</a:t>
-            </a:r>
+          <a:bodyPr>
+            <a:normAutofit/>
+          </a:bodyPr>
+          <a:lstStyle/>
+          <a:p>
+            <a:r>
+              <a:rPr lang="en-US" sz="4400" dirty="0" err="1"/>
+              <a:t>Nhóm</a:t>
+            </a:r>
+            <a:r>
+              <a:rPr lang="en-US" sz="4400" dirty="0"/>
+              <a:t> 9 – </a:t>
+            </a:r>
+            <a:r>
+              <a:rPr lang="en-US" sz="4400" dirty="0" err="1"/>
+              <a:t>Thành</a:t>
+            </a:r>
+            <a:r>
+              <a:rPr lang="en-US" sz="4400" dirty="0"/>
+              <a:t> </a:t>
+            </a:r>
+            <a:r>
+              <a:rPr lang="en-US" sz="4400" dirty="0" err="1"/>
+              <a:t>viên</a:t>
+            </a:r>
+            <a:endParaRPr lang="en-US" sz="4400" dirty="0"/>
           </a:p>
         </p:txBody>
       </p:sp>
@@ -7102,22 +7885,24 @@
         </p:nvSpPr>
         <p:spPr/>
         <p:txBody>
-          <a:bodyPr/>
-          <a:lstStyle/>
-          <a:p>
-            <a:r>
-              <a:rPr lang="en-US"/>
+          <a:bodyPr>
+            <a:normAutofit/>
+          </a:bodyPr>
+          <a:lstStyle/>
+          <a:p>
+            <a:r>
+              <a:rPr lang="en-US" sz="2400" dirty="0"/>
               <a:t>TRẦN BÌNH VĂN</a:t>
             </a:r>
           </a:p>
           <a:p>
             <a:r>
-              <a:rPr lang="en-US"/>
+              <a:rPr lang="en-US" sz="2400" dirty="0"/>
               <a:t>LÊ VĂN THẮNG </a:t>
             </a:r>
           </a:p>
           <a:p>
-            <a:endParaRPr lang="en-US"/>
+            <a:endParaRPr lang="en-US" sz="2400" dirty="0"/>
           </a:p>
         </p:txBody>
       </p:sp>

</xml_diff>